<commit_message>
Updates for GA Project
Minor updates to begin coverage analysis for GA project
</commit_message>
<xml_diff>
--- a/doc/Coordinate_Frames_and_Time_Systems.pptx
+++ b/doc/Coordinate_Frames_and_Time_Systems.pptx
@@ -109,6 +109,11 @@
       </a:defRPr>
     </a:lvl9pPr>
   </p:defaultTextStyle>
+  <p:extLst>
+    <p:ext uri="{EFAFB233-063F-42B5-8137-9DF3F51BA10A}">
+      <p15:sldGuideLst xmlns:p15="http://schemas.microsoft.com/office/powerpoint/2012/main"/>
+    </p:ext>
+  </p:extLst>
 </p:presentation>
 </file>
 
@@ -515,7 +520,7 @@
           <a:p>
             <a:fld id="{78ABE3C1-DBE1-495D-B57B-2849774B866A}" type="datetimeFigureOut">
               <a:rPr lang="en-US" smtClean="0"/>
-              <a:t>3/28/2021</a:t>
+              <a:t>3/29/2021</a:t>
             </a:fld>
             <a:endParaRPr lang="en-US" dirty="0"/>
           </a:p>
@@ -694,7 +699,7 @@
           <a:p>
             <a:fld id="{1FA3F48C-C7C6-4055-9F49-3777875E72AE}" type="datetimeFigureOut">
               <a:rPr lang="en-US" smtClean="0"/>
-              <a:t>3/28/2021</a:t>
+              <a:t>3/29/2021</a:t>
             </a:fld>
             <a:endParaRPr lang="en-US" dirty="0"/>
           </a:p>
@@ -874,7 +879,7 @@
           <a:p>
             <a:fld id="{6178E61D-D431-422C-9764-11DAFE33AB63}" type="datetimeFigureOut">
               <a:rPr lang="en-US" smtClean="0"/>
-              <a:t>3/28/2021</a:t>
+              <a:t>3/29/2021</a:t>
             </a:fld>
             <a:endParaRPr lang="en-US" dirty="0"/>
           </a:p>
@@ -1045,7 +1050,7 @@
           <a:p>
             <a:fld id="{12DE42F4-6EEF-4EF7-8ED4-2208F0F89A08}" type="datetimeFigureOut">
               <a:rPr lang="en-US" smtClean="0"/>
-              <a:t>3/28/2021</a:t>
+              <a:t>3/29/2021</a:t>
             </a:fld>
             <a:endParaRPr lang="en-US" dirty="0"/>
           </a:p>
@@ -1358,7 +1363,7 @@
           <a:p>
             <a:fld id="{30578ACC-22D6-47C1-A373-4FD133E34F3C}" type="datetimeFigureOut">
               <a:rPr lang="en-US" smtClean="0"/>
-              <a:t>3/28/2021</a:t>
+              <a:t>3/29/2021</a:t>
             </a:fld>
             <a:endParaRPr lang="en-US" dirty="0"/>
           </a:p>
@@ -1744,7 +1749,7 @@
           <a:p>
             <a:fld id="{4E5A6C69-6797-4E8A-BF37-F2C3751466E9}" type="datetimeFigureOut">
               <a:rPr lang="en-US" smtClean="0"/>
-              <a:t>3/28/2021</a:t>
+              <a:t>3/29/2021</a:t>
             </a:fld>
             <a:endParaRPr lang="en-US" dirty="0"/>
           </a:p>
@@ -2178,7 +2183,7 @@
           <a:p>
             <a:fld id="{D82014A1-A632-4878-A0D3-F52BA7563730}" type="datetimeFigureOut">
               <a:rPr lang="en-US" smtClean="0"/>
-              <a:t>3/28/2021</a:t>
+              <a:t>3/29/2021</a:t>
             </a:fld>
             <a:endParaRPr lang="en-US" dirty="0"/>
           </a:p>
@@ -2296,7 +2301,7 @@
           <a:p>
             <a:fld id="{CE99F462-093F-4566-844B-4C71F2739DA5}" type="datetimeFigureOut">
               <a:rPr lang="en-US" smtClean="0"/>
-              <a:t>3/28/2021</a:t>
+              <a:t>3/29/2021</a:t>
             </a:fld>
             <a:endParaRPr lang="en-US" dirty="0"/>
           </a:p>
@@ -2391,7 +2396,7 @@
           <a:p>
             <a:fld id="{3D24A7AC-904D-4781-85BA-7D10C17ED021}" type="datetimeFigureOut">
               <a:rPr lang="en-US" smtClean="0"/>
-              <a:t>3/28/2021</a:t>
+              <a:t>3/29/2021</a:t>
             </a:fld>
             <a:endParaRPr lang="en-US" dirty="0"/>
           </a:p>
@@ -2741,7 +2746,7 @@
           <a:p>
             <a:fld id="{E331444B-B92B-4E27-8C94-BB93EAF5CB18}" type="datetimeFigureOut">
               <a:rPr lang="en-US" smtClean="0"/>
-              <a:t>3/28/2021</a:t>
+              <a:t>3/29/2021</a:t>
             </a:fld>
             <a:endParaRPr lang="en-US" dirty="0"/>
           </a:p>
@@ -3166,7 +3171,7 @@
           <a:p>
             <a:fld id="{363EFA5E-FA76-400D-B3DC-F0BA90E6D107}" type="datetimeFigureOut">
               <a:rPr lang="en-US" smtClean="0"/>
-              <a:t>3/28/2021</a:t>
+              <a:t>3/29/2021</a:t>
             </a:fld>
             <a:endParaRPr lang="en-US" dirty="0"/>
           </a:p>
@@ -3447,7 +3452,7 @@
           <a:p>
             <a:fld id="{9D6E9DEC-419B-4CC5-A080-3B06BD5A8291}" type="datetimeFigureOut">
               <a:rPr lang="en-US" smtClean="0"/>
-              <a:t>3/28/2021</a:t>
+              <a:t>3/29/2021</a:t>
             </a:fld>
             <a:endParaRPr lang="en-US" dirty="0"/>
           </a:p>
@@ -4523,6 +4528,7 @@
                 <a:endParaRPr lang="en-US" dirty="0"/>
               </a:p>
               <a:p>
+                <a:pPr/>
                 <a14:m>
                   <m:oMathPara xmlns:m="http://schemas.openxmlformats.org/officeDocument/2006/math">
                     <m:oMathParaPr>
@@ -4661,7 +4667,13 @@
                             <a:rPr lang="en-US" b="0" i="1" smtClean="0">
                               <a:latin typeface="Cambria Math" panose="02040503050406030204" pitchFamily="18" charset="0"/>
                             </a:rPr>
-                            <m:t>𝐼𝑅</m:t>
+                            <m:t>𝐼</m:t>
+                          </m:r>
+                          <m:r>
+                            <a:rPr lang="en-US" b="0" i="1" smtClean="0">
+                              <a:latin typeface="Cambria Math" panose="02040503050406030204" pitchFamily="18" charset="0"/>
+                            </a:rPr>
+                            <m:t>𝑇</m:t>
                           </m:r>
                           <m:r>
                             <a:rPr lang="en-US" i="1">
@@ -4680,6 +4692,7 @@
                 <a:endParaRPr lang="en-US" dirty="0"/>
               </a:p>
               <a:p>
+                <a:pPr/>
                 <a14:m>
                   <m:oMathPara xmlns:m="http://schemas.openxmlformats.org/officeDocument/2006/math">
                     <m:oMathParaPr>
@@ -4719,13 +4732,7 @@
                             <a:rPr lang="en-US" b="0" i="1" smtClean="0">
                               <a:latin typeface="Cambria Math" panose="02040503050406030204" pitchFamily="18" charset="0"/>
                             </a:rPr>
-                            <m:t>𝐼𝑇</m:t>
-                          </m:r>
-                          <m:r>
-                            <a:rPr lang="en-US" b="0" i="1" smtClean="0">
-                              <a:latin typeface="Cambria Math" panose="02040503050406030204" pitchFamily="18" charset="0"/>
-                            </a:rPr>
-                            <m:t>𝑅𝐹</m:t>
+                            <m:t>𝐼𝑇𝑅𝐹</m:t>
                           </m:r>
                         </m:sub>
                       </m:sSub>
@@ -5364,8 +5371,8 @@
           </a:p>
         </p:txBody>
       </p:sp>
-      <mc:AlternateContent xmlns:mc="http://schemas.openxmlformats.org/markup-compatibility/2006">
-        <mc:Choice xmlns:a14="http://schemas.microsoft.com/office/drawing/2010/main" Requires="a14">
+      <mc:AlternateContent xmlns:mc="http://schemas.openxmlformats.org/markup-compatibility/2006" xmlns:a14="http://schemas.microsoft.com/office/drawing/2010/main">
+        <mc:Choice Requires="a14">
           <p:sp>
             <p:nvSpPr>
               <p:cNvPr id="7" name="TextBox 6">
@@ -5412,6 +5419,7 @@
                 <a:endParaRPr lang="en-US" dirty="0"/>
               </a:p>
               <a:p>
+                <a:pPr/>
                 <a14:m>
                   <m:oMathPara xmlns:m="http://schemas.openxmlformats.org/officeDocument/2006/math">
                     <m:oMathParaPr>
@@ -5563,6 +5571,7 @@
                 <a:endParaRPr lang="en-US" dirty="0"/>
               </a:p>
               <a:p>
+                <a:pPr/>
                 <a14:m>
                   <m:oMathPara xmlns:m="http://schemas.openxmlformats.org/officeDocument/2006/math">
                     <m:oMathParaPr>
@@ -5774,7 +5783,7 @@
             </p:txBody>
           </p:sp>
         </mc:Choice>
-        <mc:Fallback>
+        <mc:Fallback xmlns="">
           <p:sp>
             <p:nvSpPr>
               <p:cNvPr id="7" name="TextBox 6">
@@ -6183,8 +6192,8 @@
           </a:p>
         </p:txBody>
       </p:sp>
-      <mc:AlternateContent xmlns:mc="http://schemas.openxmlformats.org/markup-compatibility/2006">
-        <mc:Choice xmlns:a14="http://schemas.microsoft.com/office/drawing/2010/main" Requires="a14">
+      <mc:AlternateContent xmlns:mc="http://schemas.openxmlformats.org/markup-compatibility/2006" xmlns:a14="http://schemas.microsoft.com/office/drawing/2010/main">
+        <mc:Choice Requires="a14">
           <p:graphicFrame>
             <p:nvGraphicFramePr>
               <p:cNvPr id="3" name="Table 3">
@@ -7295,7 +7304,7 @@
             </a:graphic>
           </p:graphicFrame>
         </mc:Choice>
-        <mc:Fallback>
+        <mc:Fallback xmlns="">
           <p:graphicFrame>
             <p:nvGraphicFramePr>
               <p:cNvPr id="3" name="Table 3">

</xml_diff>